<commit_message>
Updating file for handling the synamic changes in S3 bucket properly
</commit_message>
<xml_diff>
--- a/docs/Mp4ToHLS.pptx
+++ b/docs/Mp4ToHLS.pptx
@@ -11,6 +11,11 @@
     <p:sldId id="262" r:id="rId5"/>
     <p:sldId id="259" r:id="rId6"/>
     <p:sldId id="260" r:id="rId7"/>
+    <p:sldId id="263" r:id="rId8"/>
+    <p:sldId id="264" r:id="rId9"/>
+    <p:sldId id="265" r:id="rId10"/>
+    <p:sldId id="266" r:id="rId11"/>
+    <p:sldId id="267" r:id="rId12"/>
   </p:sldIdLst>
   <p:sldSz cx="12192000" cy="6858000"/>
   <p:notesSz cx="6858000" cy="9144000"/>
@@ -109,6 +114,11 @@
       </a:defRPr>
     </a:lvl9pPr>
   </p:defaultTextStyle>
+  <p:extLst>
+    <p:ext uri="{EFAFB233-063F-42B5-8137-9DF3F51BA10A}">
+      <p15:sldGuideLst xmlns:p15="http://schemas.microsoft.com/office/powerpoint/2012/main"/>
+    </p:ext>
+  </p:extLst>
 </p:presentation>
 </file>
 
@@ -3441,6 +3451,945 @@
 </p:sld>
 </file>
 
+<file path=ppt/slides/slide10.xml><?xml version="1.0" encoding="utf-8"?>
+<p:sld xmlns:a="http://schemas.openxmlformats.org/drawingml/2006/main" xmlns:r="http://schemas.openxmlformats.org/officeDocument/2006/relationships" xmlns:p="http://schemas.openxmlformats.org/presentationml/2006/main">
+  <p:cSld>
+    <p:spTree>
+      <p:nvGrpSpPr>
+        <p:cNvPr id="1" name=""/>
+        <p:cNvGrpSpPr/>
+        <p:nvPr/>
+      </p:nvGrpSpPr>
+      <p:grpSpPr>
+        <a:xfrm>
+          <a:off x="0" y="0"/>
+          <a:ext cx="0" cy="0"/>
+          <a:chOff x="0" y="0"/>
+          <a:chExt cx="0" cy="0"/>
+        </a:xfrm>
+      </p:grpSpPr>
+      <p:sp>
+        <p:nvSpPr>
+          <p:cNvPr id="2" name="TextBox 1">
+            <a:extLst>
+              <a:ext uri="{FF2B5EF4-FFF2-40B4-BE49-F238E27FC236}">
+                <a16:creationId xmlns:a16="http://schemas.microsoft.com/office/drawing/2014/main" id="{2C265965-136C-12A1-055A-8C1D00DA0493}"/>
+              </a:ext>
+            </a:extLst>
+          </p:cNvPr>
+          <p:cNvSpPr txBox="1"/>
+          <p:nvPr/>
+        </p:nvSpPr>
+        <p:spPr>
+          <a:xfrm>
+            <a:off x="3945036" y="79866"/>
+            <a:ext cx="4613748" cy="646331"/>
+          </a:xfrm>
+          <a:prstGeom prst="rect">
+            <a:avLst/>
+          </a:prstGeom>
+          <a:noFill/>
+        </p:spPr>
+        <p:txBody>
+          <a:bodyPr wrap="square" rtlCol="0">
+            <a:spAutoFit/>
+          </a:bodyPr>
+          <a:lstStyle/>
+          <a:p>
+            <a:r>
+              <a:rPr lang="en-IN" dirty="0"/>
+              <a:t>Update the Cache of the CloudFront distribution </a:t>
+            </a:r>
+          </a:p>
+        </p:txBody>
+      </p:sp>
+      <p:sp>
+        <p:nvSpPr>
+          <p:cNvPr id="3" name="Rectangle 2">
+            <a:extLst>
+              <a:ext uri="{FF2B5EF4-FFF2-40B4-BE49-F238E27FC236}">
+                <a16:creationId xmlns:a16="http://schemas.microsoft.com/office/drawing/2014/main" id="{A6AE37A1-9329-E66A-748C-E67F9664C20D}"/>
+              </a:ext>
+            </a:extLst>
+          </p:cNvPr>
+          <p:cNvSpPr/>
+          <p:nvPr/>
+        </p:nvSpPr>
+        <p:spPr>
+          <a:xfrm>
+            <a:off x="3502165" y="94154"/>
+            <a:ext cx="4613747" cy="751564"/>
+          </a:xfrm>
+          <a:prstGeom prst="rect">
+            <a:avLst/>
+          </a:prstGeom>
+          <a:solidFill>
+            <a:schemeClr val="accent4">
+              <a:alpha val="50000"/>
+            </a:schemeClr>
+          </a:solidFill>
+          <a:ln>
+            <a:noFill/>
+          </a:ln>
+        </p:spPr>
+        <p:style>
+          <a:lnRef idx="0">
+            <a:scrgbClr r="0" g="0" b="0"/>
+          </a:lnRef>
+          <a:fillRef idx="0">
+            <a:scrgbClr r="0" g="0" b="0"/>
+          </a:fillRef>
+          <a:effectRef idx="0">
+            <a:scrgbClr r="0" g="0" b="0"/>
+          </a:effectRef>
+          <a:fontRef idx="minor">
+            <a:schemeClr val="lt1"/>
+          </a:fontRef>
+        </p:style>
+        <p:txBody>
+          <a:bodyPr rtlCol="0" anchor="ctr"/>
+          <a:lstStyle/>
+          <a:p>
+            <a:pPr algn="ctr"/>
+            <a:endParaRPr lang="en-IN" dirty="0"/>
+          </a:p>
+        </p:txBody>
+      </p:sp>
+      <p:sp>
+        <p:nvSpPr>
+          <p:cNvPr id="6" name="TextBox 5">
+            <a:extLst>
+              <a:ext uri="{FF2B5EF4-FFF2-40B4-BE49-F238E27FC236}">
+                <a16:creationId xmlns:a16="http://schemas.microsoft.com/office/drawing/2014/main" id="{BD8DF3EC-4603-A48E-2A10-F49FA9D92902}"/>
+              </a:ext>
+            </a:extLst>
+          </p:cNvPr>
+          <p:cNvSpPr txBox="1"/>
+          <p:nvPr/>
+        </p:nvSpPr>
+        <p:spPr>
+          <a:xfrm>
+            <a:off x="1207008" y="2399302"/>
+            <a:ext cx="10003536" cy="4378832"/>
+          </a:xfrm>
+          <a:prstGeom prst="rect">
+            <a:avLst/>
+          </a:prstGeom>
+          <a:noFill/>
+        </p:spPr>
+        <p:txBody>
+          <a:bodyPr wrap="square">
+            <a:spAutoFit/>
+          </a:bodyPr>
+          <a:lstStyle/>
+          <a:p>
+            <a:r>
+              <a:rPr lang="en-IN" sz="1600" dirty="0"/>
+              <a:t>import boto3</a:t>
+            </a:r>
+          </a:p>
+          <a:p>
+            <a:endParaRPr lang="en-IN" sz="1600" dirty="0"/>
+          </a:p>
+          <a:p>
+            <a:r>
+              <a:rPr lang="en-IN" sz="1600" dirty="0"/>
+              <a:t>def </a:t>
+            </a:r>
+            <a:r>
+              <a:rPr lang="en-IN" sz="1600" dirty="0" err="1"/>
+              <a:t>lambda_handler</a:t>
+            </a:r>
+            <a:r>
+              <a:rPr lang="en-IN" sz="1600" dirty="0"/>
+              <a:t>(event, context):</a:t>
+            </a:r>
+          </a:p>
+          <a:p>
+            <a:r>
+              <a:rPr lang="en-IN" sz="1600" dirty="0"/>
+              <a:t>    # Create CloudFront client</a:t>
+            </a:r>
+          </a:p>
+          <a:p>
+            <a:r>
+              <a:rPr lang="en-IN" sz="1600" dirty="0"/>
+              <a:t>    </a:t>
+            </a:r>
+            <a:r>
+              <a:rPr lang="en-IN" sz="1600" dirty="0" err="1"/>
+              <a:t>cf</a:t>
+            </a:r>
+            <a:r>
+              <a:rPr lang="en-IN" sz="1600" dirty="0"/>
+              <a:t> = boto3.client(‘CloudFront)</a:t>
+            </a:r>
+          </a:p>
+          <a:p>
+            <a:endParaRPr lang="en-IN" sz="1600" dirty="0"/>
+          </a:p>
+          <a:p>
+            <a:r>
+              <a:rPr lang="en-IN" sz="1600" dirty="0"/>
+              <a:t>    # Define the CloudFront distribution ID and the file paths to invalidate</a:t>
+            </a:r>
+          </a:p>
+          <a:p>
+            <a:r>
+              <a:rPr lang="en-IN" sz="1600" dirty="0"/>
+              <a:t>    </a:t>
+            </a:r>
+            <a:r>
+              <a:rPr lang="en-IN" sz="1600" dirty="0" err="1"/>
+              <a:t>distribution_id</a:t>
+            </a:r>
+            <a:r>
+              <a:rPr lang="en-IN" sz="1600" dirty="0"/>
+              <a:t> = 'YOUR_DISTRIBUTION_ID'</a:t>
+            </a:r>
+          </a:p>
+          <a:p>
+            <a:r>
+              <a:rPr lang="en-IN" sz="1600" dirty="0"/>
+              <a:t>    items = [{'Quantity': </a:t>
+            </a:r>
+            <a:r>
+              <a:rPr lang="en-IN" sz="1600" dirty="0" err="1"/>
+              <a:t>len</a:t>
+            </a:r>
+            <a:r>
+              <a:rPr lang="en-IN" sz="1600" dirty="0"/>
+              <a:t>(event['Records']), 'Items': [record['s3']['object']['key'] for record in event['Records']]}]</a:t>
+            </a:r>
+          </a:p>
+          <a:p>
+            <a:endParaRPr lang="en-IN" sz="1600" dirty="0"/>
+          </a:p>
+          <a:p>
+            <a:r>
+              <a:rPr lang="en-IN" sz="1600" dirty="0"/>
+              <a:t>    # Create invalidation</a:t>
+            </a:r>
+          </a:p>
+          <a:p>
+            <a:r>
+              <a:rPr lang="en-IN" sz="1600" dirty="0"/>
+              <a:t>    response = </a:t>
+            </a:r>
+            <a:r>
+              <a:rPr lang="en-IN" sz="1600" dirty="0" err="1"/>
+              <a:t>cf.create_invalidation</a:t>
+            </a:r>
+            <a:r>
+              <a:rPr lang="en-IN" sz="1600" dirty="0"/>
+              <a:t>(</a:t>
+            </a:r>
+            <a:r>
+              <a:rPr lang="en-IN" sz="1600" dirty="0" err="1"/>
+              <a:t>DistributionId</a:t>
+            </a:r>
+            <a:r>
+              <a:rPr lang="en-IN" sz="1600" dirty="0"/>
+              <a:t>=</a:t>
+            </a:r>
+            <a:r>
+              <a:rPr lang="en-IN" sz="1600" dirty="0" err="1"/>
+              <a:t>distribution_id</a:t>
+            </a:r>
+            <a:r>
+              <a:rPr lang="en-IN" sz="1600" dirty="0"/>
+              <a:t>,</a:t>
+            </a:r>
+          </a:p>
+          <a:p>
+            <a:r>
+              <a:rPr lang="en-IN" sz="1600" dirty="0"/>
+              <a:t>                                      </a:t>
+            </a:r>
+            <a:r>
+              <a:rPr lang="en-IN" sz="1600" dirty="0" err="1"/>
+              <a:t>InvalidationBatch</a:t>
+            </a:r>
+            <a:r>
+              <a:rPr lang="en-IN" sz="1600" dirty="0"/>
+              <a:t>={</a:t>
+            </a:r>
+          </a:p>
+          <a:p>
+            <a:r>
+              <a:rPr lang="en-IN" sz="1600" dirty="0"/>
+              <a:t>                                          'Paths': items,</a:t>
+            </a:r>
+          </a:p>
+          <a:p>
+            <a:r>
+              <a:rPr lang="en-IN" sz="1600" dirty="0"/>
+              <a:t>                                          '</a:t>
+            </a:r>
+            <a:r>
+              <a:rPr lang="en-IN" sz="1600" dirty="0" err="1"/>
+              <a:t>CallerReference</a:t>
+            </a:r>
+            <a:r>
+              <a:rPr lang="en-IN" sz="1600" dirty="0"/>
+              <a:t>': str(</a:t>
+            </a:r>
+            <a:r>
+              <a:rPr lang="en-IN" sz="1600" dirty="0" err="1"/>
+              <a:t>context.aws_request_id</a:t>
+            </a:r>
+            <a:r>
+              <a:rPr lang="en-IN" sz="1600" dirty="0"/>
+              <a:t>)</a:t>
+            </a:r>
+          </a:p>
+          <a:p>
+            <a:r>
+              <a:rPr lang="en-IN" sz="1600" dirty="0"/>
+              <a:t>                                      })</a:t>
+            </a:r>
+          </a:p>
+          <a:p>
+            <a:r>
+              <a:rPr lang="en-IN" sz="1600" dirty="0"/>
+              <a:t>    return response</a:t>
+            </a:r>
+          </a:p>
+        </p:txBody>
+      </p:sp>
+      <p:pic>
+        <p:nvPicPr>
+          <p:cNvPr id="11" name="Picture 10">
+            <a:extLst>
+              <a:ext uri="{FF2B5EF4-FFF2-40B4-BE49-F238E27FC236}">
+                <a16:creationId xmlns:a16="http://schemas.microsoft.com/office/drawing/2014/main" id="{B66D3FDB-56B9-BE33-E7A7-80BA514A2A3F}"/>
+              </a:ext>
+            </a:extLst>
+          </p:cNvPr>
+          <p:cNvPicPr>
+            <a:picLocks noChangeAspect="1"/>
+          </p:cNvPicPr>
+          <p:nvPr/>
+        </p:nvPicPr>
+        <p:blipFill>
+          <a:blip r:embed="rId2"/>
+          <a:stretch>
+            <a:fillRect/>
+          </a:stretch>
+        </p:blipFill>
+        <p:spPr>
+          <a:xfrm>
+            <a:off x="1112520" y="891284"/>
+            <a:ext cx="9659112" cy="1342931"/>
+          </a:xfrm>
+          <a:prstGeom prst="rect">
+            <a:avLst/>
+          </a:prstGeom>
+        </p:spPr>
+      </p:pic>
+      <p:sp>
+        <p:nvSpPr>
+          <p:cNvPr id="12" name="Rectangle 11">
+            <a:extLst>
+              <a:ext uri="{FF2B5EF4-FFF2-40B4-BE49-F238E27FC236}">
+                <a16:creationId xmlns:a16="http://schemas.microsoft.com/office/drawing/2014/main" id="{D1D24563-E6A4-71A5-9DF1-2976757B183D}"/>
+              </a:ext>
+            </a:extLst>
+          </p:cNvPr>
+          <p:cNvSpPr/>
+          <p:nvPr/>
+        </p:nvSpPr>
+        <p:spPr>
+          <a:xfrm>
+            <a:off x="621792" y="891284"/>
+            <a:ext cx="11009376" cy="5792980"/>
+          </a:xfrm>
+          <a:prstGeom prst="rect">
+            <a:avLst/>
+          </a:prstGeom>
+          <a:noFill/>
+          <a:ln w="9525" cap="flat" cmpd="sng" algn="ctr">
+            <a:solidFill>
+              <a:schemeClr val="accent3"/>
+            </a:solidFill>
+            <a:prstDash val="solid"/>
+            <a:round/>
+            <a:headEnd type="none" w="med" len="med"/>
+            <a:tailEnd type="none" w="med" len="med"/>
+          </a:ln>
+        </p:spPr>
+        <p:style>
+          <a:lnRef idx="0">
+            <a:scrgbClr r="0" g="0" b="0"/>
+          </a:lnRef>
+          <a:fillRef idx="0">
+            <a:scrgbClr r="0" g="0" b="0"/>
+          </a:fillRef>
+          <a:effectRef idx="0">
+            <a:scrgbClr r="0" g="0" b="0"/>
+          </a:effectRef>
+          <a:fontRef idx="minor">
+            <a:schemeClr val="accent3"/>
+          </a:fontRef>
+        </p:style>
+        <p:txBody>
+          <a:bodyPr rtlCol="0" anchor="ctr"/>
+          <a:lstStyle/>
+          <a:p>
+            <a:pPr algn="ctr"/>
+            <a:endParaRPr lang="en-IN" dirty="0"/>
+          </a:p>
+        </p:txBody>
+      </p:sp>
+      <p:pic>
+        <p:nvPicPr>
+          <p:cNvPr id="15" name="Picture 14">
+            <a:extLst>
+              <a:ext uri="{FF2B5EF4-FFF2-40B4-BE49-F238E27FC236}">
+                <a16:creationId xmlns:a16="http://schemas.microsoft.com/office/drawing/2014/main" id="{CFA52A9F-0E74-6DD0-9A78-74312A9F9BED}"/>
+              </a:ext>
+            </a:extLst>
+          </p:cNvPr>
+          <p:cNvPicPr>
+            <a:picLocks noChangeAspect="1"/>
+          </p:cNvPicPr>
+          <p:nvPr/>
+        </p:nvPicPr>
+        <p:blipFill>
+          <a:blip r:embed="rId3"/>
+          <a:stretch>
+            <a:fillRect/>
+          </a:stretch>
+        </p:blipFill>
+        <p:spPr>
+          <a:xfrm>
+            <a:off x="3836709" y="2102903"/>
+            <a:ext cx="7373835" cy="848318"/>
+          </a:xfrm>
+          <a:prstGeom prst="rect">
+            <a:avLst/>
+          </a:prstGeom>
+        </p:spPr>
+      </p:pic>
+    </p:spTree>
+    <p:extLst>
+      <p:ext uri="{BB962C8B-B14F-4D97-AF65-F5344CB8AC3E}">
+        <p14:creationId xmlns:p14="http://schemas.microsoft.com/office/powerpoint/2010/main" val="666085677"/>
+      </p:ext>
+    </p:extLst>
+  </p:cSld>
+  <p:clrMapOvr>
+    <a:masterClrMapping/>
+  </p:clrMapOvr>
+</p:sld>
+</file>
+
+<file path=ppt/slides/slide11.xml><?xml version="1.0" encoding="utf-8"?>
+<p:sld xmlns:a="http://schemas.openxmlformats.org/drawingml/2006/main" xmlns:r="http://schemas.openxmlformats.org/officeDocument/2006/relationships" xmlns:p="http://schemas.openxmlformats.org/presentationml/2006/main">
+  <p:cSld>
+    <p:spTree>
+      <p:nvGrpSpPr>
+        <p:cNvPr id="1" name=""/>
+        <p:cNvGrpSpPr/>
+        <p:nvPr/>
+      </p:nvGrpSpPr>
+      <p:grpSpPr>
+        <a:xfrm>
+          <a:off x="0" y="0"/>
+          <a:ext cx="0" cy="0"/>
+          <a:chOff x="0" y="0"/>
+          <a:chExt cx="0" cy="0"/>
+        </a:xfrm>
+      </p:grpSpPr>
+      <p:sp>
+        <p:nvSpPr>
+          <p:cNvPr id="2" name="TextBox 1">
+            <a:extLst>
+              <a:ext uri="{FF2B5EF4-FFF2-40B4-BE49-F238E27FC236}">
+                <a16:creationId xmlns:a16="http://schemas.microsoft.com/office/drawing/2014/main" id="{2C265965-136C-12A1-055A-8C1D00DA0493}"/>
+              </a:ext>
+            </a:extLst>
+          </p:cNvPr>
+          <p:cNvSpPr txBox="1"/>
+          <p:nvPr/>
+        </p:nvSpPr>
+        <p:spPr>
+          <a:xfrm>
+            <a:off x="3945036" y="79866"/>
+            <a:ext cx="4613748" cy="646331"/>
+          </a:xfrm>
+          <a:prstGeom prst="rect">
+            <a:avLst/>
+          </a:prstGeom>
+          <a:noFill/>
+        </p:spPr>
+        <p:txBody>
+          <a:bodyPr wrap="square" rtlCol="0">
+            <a:spAutoFit/>
+          </a:bodyPr>
+          <a:lstStyle/>
+          <a:p>
+            <a:r>
+              <a:rPr lang="en-IN" dirty="0"/>
+              <a:t>Update the Cache of the CloudFront distribution </a:t>
+            </a:r>
+          </a:p>
+        </p:txBody>
+      </p:sp>
+      <p:sp>
+        <p:nvSpPr>
+          <p:cNvPr id="3" name="Rectangle 2">
+            <a:extLst>
+              <a:ext uri="{FF2B5EF4-FFF2-40B4-BE49-F238E27FC236}">
+                <a16:creationId xmlns:a16="http://schemas.microsoft.com/office/drawing/2014/main" id="{A6AE37A1-9329-E66A-748C-E67F9664C20D}"/>
+              </a:ext>
+            </a:extLst>
+          </p:cNvPr>
+          <p:cNvSpPr/>
+          <p:nvPr/>
+        </p:nvSpPr>
+        <p:spPr>
+          <a:xfrm>
+            <a:off x="3502165" y="94154"/>
+            <a:ext cx="4613747" cy="751564"/>
+          </a:xfrm>
+          <a:prstGeom prst="rect">
+            <a:avLst/>
+          </a:prstGeom>
+          <a:solidFill>
+            <a:schemeClr val="accent4">
+              <a:alpha val="50000"/>
+            </a:schemeClr>
+          </a:solidFill>
+          <a:ln>
+            <a:noFill/>
+          </a:ln>
+        </p:spPr>
+        <p:style>
+          <a:lnRef idx="0">
+            <a:scrgbClr r="0" g="0" b="0"/>
+          </a:lnRef>
+          <a:fillRef idx="0">
+            <a:scrgbClr r="0" g="0" b="0"/>
+          </a:fillRef>
+          <a:effectRef idx="0">
+            <a:scrgbClr r="0" g="0" b="0"/>
+          </a:effectRef>
+          <a:fontRef idx="minor">
+            <a:schemeClr val="lt1"/>
+          </a:fontRef>
+        </p:style>
+        <p:txBody>
+          <a:bodyPr rtlCol="0" anchor="ctr"/>
+          <a:lstStyle/>
+          <a:p>
+            <a:pPr algn="ctr"/>
+            <a:endParaRPr lang="en-IN" dirty="0"/>
+          </a:p>
+        </p:txBody>
+      </p:sp>
+      <p:sp>
+        <p:nvSpPr>
+          <p:cNvPr id="5" name="TextBox 4">
+            <a:extLst>
+              <a:ext uri="{FF2B5EF4-FFF2-40B4-BE49-F238E27FC236}">
+                <a16:creationId xmlns:a16="http://schemas.microsoft.com/office/drawing/2014/main" id="{9B9BD926-67D0-13C2-0B17-058C1A4DD430}"/>
+              </a:ext>
+            </a:extLst>
+          </p:cNvPr>
+          <p:cNvSpPr txBox="1"/>
+          <p:nvPr/>
+        </p:nvSpPr>
+        <p:spPr>
+          <a:xfrm>
+            <a:off x="605254" y="1121787"/>
+            <a:ext cx="11045750" cy="4888198"/>
+          </a:xfrm>
+          <a:prstGeom prst="rect">
+            <a:avLst/>
+          </a:prstGeom>
+          <a:noFill/>
+        </p:spPr>
+        <p:txBody>
+          <a:bodyPr wrap="square">
+            <a:spAutoFit/>
+          </a:bodyPr>
+          <a:lstStyle/>
+          <a:p>
+            <a:pPr algn="l"/>
+            <a:r>
+              <a:rPr lang="en-US" b="1" i="0" dirty="0">
+                <a:solidFill>
+                  <a:srgbClr val="0D0D0D"/>
+                </a:solidFill>
+                <a:effectLst/>
+                <a:highlight>
+                  <a:srgbClr val="FFFFFF"/>
+                </a:highlight>
+                <a:latin typeface="Segoe UI" panose="020B0502040204020203" pitchFamily="34" charset="0"/>
+                <a:cs typeface="Segoe UI" panose="020B0502040204020203" pitchFamily="34" charset="0"/>
+              </a:rPr>
+              <a:t>Step 5: Configure IAM Roles and Permissions</a:t>
+            </a:r>
+          </a:p>
+          <a:p>
+            <a:pPr algn="l">
+              <a:lnSpc>
+                <a:spcPct val="150000"/>
+              </a:lnSpc>
+              <a:buFont typeface="+mj-lt"/>
+              <a:buAutoNum type="arabicPeriod"/>
+            </a:pPr>
+            <a:r>
+              <a:rPr lang="en-US" b="0" i="0" dirty="0">
+                <a:solidFill>
+                  <a:srgbClr val="0D0D0D"/>
+                </a:solidFill>
+                <a:effectLst/>
+                <a:highlight>
+                  <a:srgbClr val="FFFFFF"/>
+                </a:highlight>
+                <a:latin typeface="Segoe UI" panose="020B0502040204020203" pitchFamily="34" charset="0"/>
+                <a:cs typeface="Segoe UI" panose="020B0502040204020203" pitchFamily="34" charset="0"/>
+              </a:rPr>
+              <a:t>Ensure the IAM role used by your Lambda function has the following policies attached:</a:t>
+            </a:r>
+          </a:p>
+          <a:p>
+            <a:pPr marL="742950" lvl="1" indent="-285750" algn="l">
+              <a:lnSpc>
+                <a:spcPct val="150000"/>
+              </a:lnSpc>
+              <a:buFont typeface="Wingdings" panose="05000000000000000000" pitchFamily="2" charset="2"/>
+              <a:buChar char="ü"/>
+            </a:pPr>
+            <a:r>
+              <a:rPr lang="en-US" b="0" i="0" dirty="0">
+                <a:solidFill>
+                  <a:srgbClr val="0D0D0D"/>
+                </a:solidFill>
+                <a:effectLst/>
+                <a:highlight>
+                  <a:srgbClr val="FFFFFF"/>
+                </a:highlight>
+                <a:latin typeface="Segoe UI" panose="020B0502040204020203" pitchFamily="34" charset="0"/>
+                <a:cs typeface="Segoe UI" panose="020B0502040204020203" pitchFamily="34" charset="0"/>
+              </a:rPr>
+              <a:t>AmazonS3ReadOnlyAccess</a:t>
+            </a:r>
+          </a:p>
+          <a:p>
+            <a:pPr marL="742950" lvl="1" indent="-285750" algn="l">
+              <a:lnSpc>
+                <a:spcPct val="150000"/>
+              </a:lnSpc>
+              <a:buFont typeface="Wingdings" panose="05000000000000000000" pitchFamily="2" charset="2"/>
+              <a:buChar char="ü"/>
+            </a:pPr>
+            <a:r>
+              <a:rPr lang="en-US" b="0" i="0" dirty="0">
+                <a:solidFill>
+                  <a:srgbClr val="0D0D0D"/>
+                </a:solidFill>
+                <a:effectLst/>
+                <a:highlight>
+                  <a:srgbClr val="FFFFFF"/>
+                </a:highlight>
+                <a:latin typeface="Segoe UI" panose="020B0502040204020203" pitchFamily="34" charset="0"/>
+                <a:cs typeface="Segoe UI" panose="020B0502040204020203" pitchFamily="34" charset="0"/>
+              </a:rPr>
+              <a:t>CloudFrontFullAccess (or a custom policy with permissions to invalidate CloudFront distributions).</a:t>
+            </a:r>
+          </a:p>
+          <a:p>
+            <a:pPr algn="l">
+              <a:lnSpc>
+                <a:spcPct val="150000"/>
+              </a:lnSpc>
+              <a:buFont typeface="+mj-lt"/>
+              <a:buAutoNum type="arabicPeriod"/>
+            </a:pPr>
+            <a:r>
+              <a:rPr lang="en-US" b="0" i="0" dirty="0">
+                <a:solidFill>
+                  <a:srgbClr val="0D0D0D"/>
+                </a:solidFill>
+                <a:effectLst/>
+                <a:highlight>
+                  <a:srgbClr val="FFFFFF"/>
+                </a:highlight>
+                <a:latin typeface="Segoe UI" panose="020B0502040204020203" pitchFamily="34" charset="0"/>
+                <a:cs typeface="Segoe UI" panose="020B0502040204020203" pitchFamily="34" charset="0"/>
+              </a:rPr>
+              <a:t>To add permissions, go to the </a:t>
+            </a:r>
+            <a:r>
+              <a:rPr lang="en-US" b="1" i="0" dirty="0">
+                <a:solidFill>
+                  <a:srgbClr val="0D0D0D"/>
+                </a:solidFill>
+                <a:effectLst/>
+                <a:highlight>
+                  <a:srgbClr val="FFFFFF"/>
+                </a:highlight>
+                <a:latin typeface="Segoe UI" panose="020B0502040204020203" pitchFamily="34" charset="0"/>
+                <a:cs typeface="Segoe UI" panose="020B0502040204020203" pitchFamily="34" charset="0"/>
+              </a:rPr>
+              <a:t>IAM service</a:t>
+            </a:r>
+            <a:r>
+              <a:rPr lang="en-US" b="0" i="0" dirty="0">
+                <a:solidFill>
+                  <a:srgbClr val="0D0D0D"/>
+                </a:solidFill>
+                <a:effectLst/>
+                <a:highlight>
+                  <a:srgbClr val="FFFFFF"/>
+                </a:highlight>
+                <a:latin typeface="Segoe UI" panose="020B0502040204020203" pitchFamily="34" charset="0"/>
+                <a:cs typeface="Segoe UI" panose="020B0502040204020203" pitchFamily="34" charset="0"/>
+              </a:rPr>
+              <a:t>, find the role, and attach the policies.</a:t>
+            </a:r>
+          </a:p>
+          <a:p>
+            <a:pPr algn="l">
+              <a:lnSpc>
+                <a:spcPct val="150000"/>
+              </a:lnSpc>
+              <a:buFont typeface="+mj-lt"/>
+              <a:buAutoNum type="arabicPeriod"/>
+            </a:pPr>
+            <a:endParaRPr lang="en-US" dirty="0">
+              <a:solidFill>
+                <a:srgbClr val="0D0D0D"/>
+              </a:solidFill>
+              <a:highlight>
+                <a:srgbClr val="FFFFFF"/>
+              </a:highlight>
+              <a:latin typeface="Segoe UI" panose="020B0502040204020203" pitchFamily="34" charset="0"/>
+              <a:cs typeface="Segoe UI" panose="020B0502040204020203" pitchFamily="34" charset="0"/>
+            </a:endParaRPr>
+          </a:p>
+          <a:p>
+            <a:pPr algn="l">
+              <a:lnSpc>
+                <a:spcPct val="150000"/>
+              </a:lnSpc>
+            </a:pPr>
+            <a:r>
+              <a:rPr lang="en-US" b="1" i="0" dirty="0">
+                <a:solidFill>
+                  <a:srgbClr val="0D0D0D"/>
+                </a:solidFill>
+                <a:effectLst/>
+                <a:highlight>
+                  <a:srgbClr val="FFFFFF"/>
+                </a:highlight>
+                <a:latin typeface="Segoe UI" panose="020B0502040204020203" pitchFamily="34" charset="0"/>
+                <a:cs typeface="Segoe UI" panose="020B0502040204020203" pitchFamily="34" charset="0"/>
+              </a:rPr>
+              <a:t>Step 6: Test and Validate</a:t>
+            </a:r>
+          </a:p>
+          <a:p>
+            <a:pPr marL="342900" indent="-342900" algn="l">
+              <a:lnSpc>
+                <a:spcPct val="150000"/>
+              </a:lnSpc>
+              <a:buFont typeface="+mj-lt"/>
+              <a:buAutoNum type="arabicPeriod"/>
+            </a:pPr>
+            <a:r>
+              <a:rPr lang="en-US" b="1" i="0" dirty="0">
+                <a:solidFill>
+                  <a:srgbClr val="0D0D0D"/>
+                </a:solidFill>
+                <a:effectLst/>
+                <a:highlight>
+                  <a:srgbClr val="FFFFFF"/>
+                </a:highlight>
+                <a:latin typeface="Segoe UI" panose="020B0502040204020203" pitchFamily="34" charset="0"/>
+                <a:cs typeface="Segoe UI" panose="020B0502040204020203" pitchFamily="34" charset="0"/>
+              </a:rPr>
+              <a:t>Upload</a:t>
+            </a:r>
+            <a:r>
+              <a:rPr lang="en-US" b="0" i="0" dirty="0">
+                <a:solidFill>
+                  <a:srgbClr val="0D0D0D"/>
+                </a:solidFill>
+                <a:effectLst/>
+                <a:highlight>
+                  <a:srgbClr val="FFFFFF"/>
+                </a:highlight>
+                <a:latin typeface="Segoe UI" panose="020B0502040204020203" pitchFamily="34" charset="0"/>
+                <a:cs typeface="Segoe UI" panose="020B0502040204020203" pitchFamily="34" charset="0"/>
+              </a:rPr>
+              <a:t> a new file to your S3 bucket or update an existing file.</a:t>
+            </a:r>
+          </a:p>
+          <a:p>
+            <a:pPr marL="342900" indent="-342900" algn="l">
+              <a:lnSpc>
+                <a:spcPct val="150000"/>
+              </a:lnSpc>
+              <a:buFont typeface="+mj-lt"/>
+              <a:buAutoNum type="arabicPeriod"/>
+            </a:pPr>
+            <a:r>
+              <a:rPr lang="en-US" b="0" i="0" dirty="0">
+                <a:solidFill>
+                  <a:srgbClr val="0D0D0D"/>
+                </a:solidFill>
+                <a:effectLst/>
+                <a:highlight>
+                  <a:srgbClr val="FFFFFF"/>
+                </a:highlight>
+                <a:latin typeface="Segoe UI" panose="020B0502040204020203" pitchFamily="34" charset="0"/>
+                <a:cs typeface="Segoe UI" panose="020B0502040204020203" pitchFamily="34" charset="0"/>
+              </a:rPr>
+              <a:t>Check the </a:t>
+            </a:r>
+            <a:r>
+              <a:rPr lang="en-US" b="1" i="0" dirty="0">
+                <a:solidFill>
+                  <a:srgbClr val="0D0D0D"/>
+                </a:solidFill>
+                <a:effectLst/>
+                <a:highlight>
+                  <a:srgbClr val="FFFFFF"/>
+                </a:highlight>
+                <a:latin typeface="Segoe UI" panose="020B0502040204020203" pitchFamily="34" charset="0"/>
+                <a:cs typeface="Segoe UI" panose="020B0502040204020203" pitchFamily="34" charset="0"/>
+              </a:rPr>
+              <a:t>Lambda function logs</a:t>
+            </a:r>
+            <a:r>
+              <a:rPr lang="en-US" b="0" i="0" dirty="0">
+                <a:solidFill>
+                  <a:srgbClr val="0D0D0D"/>
+                </a:solidFill>
+                <a:effectLst/>
+                <a:highlight>
+                  <a:srgbClr val="FFFFFF"/>
+                </a:highlight>
+                <a:latin typeface="Segoe UI" panose="020B0502040204020203" pitchFamily="34" charset="0"/>
+                <a:cs typeface="Segoe UI" panose="020B0502040204020203" pitchFamily="34" charset="0"/>
+              </a:rPr>
+              <a:t> in CloudWatch to verify it triggered correctly and executed without errors.</a:t>
+            </a:r>
+          </a:p>
+          <a:p>
+            <a:pPr marL="342900" indent="-342900" algn="l">
+              <a:lnSpc>
+                <a:spcPct val="150000"/>
+              </a:lnSpc>
+              <a:buFont typeface="+mj-lt"/>
+              <a:buAutoNum type="arabicPeriod"/>
+            </a:pPr>
+            <a:r>
+              <a:rPr lang="en-US" b="0" i="0" dirty="0">
+                <a:solidFill>
+                  <a:srgbClr val="0D0D0D"/>
+                </a:solidFill>
+                <a:effectLst/>
+                <a:highlight>
+                  <a:srgbClr val="FFFFFF"/>
+                </a:highlight>
+                <a:latin typeface="Segoe UI" panose="020B0502040204020203" pitchFamily="34" charset="0"/>
+                <a:cs typeface="Segoe UI" panose="020B0502040204020203" pitchFamily="34" charset="0"/>
+              </a:rPr>
+              <a:t>Check your CloudFront distribution’s cache to ensure the specified paths were invalidated.</a:t>
+            </a:r>
+          </a:p>
+          <a:p>
+            <a:pPr algn="l">
+              <a:lnSpc>
+                <a:spcPct val="150000"/>
+              </a:lnSpc>
+            </a:pPr>
+            <a:endParaRPr lang="en-US" b="0" i="0" dirty="0">
+              <a:solidFill>
+                <a:srgbClr val="0D0D0D"/>
+              </a:solidFill>
+              <a:effectLst/>
+              <a:highlight>
+                <a:srgbClr val="FFFFFF"/>
+              </a:highlight>
+              <a:latin typeface="Segoe UI" panose="020B0502040204020203" pitchFamily="34" charset="0"/>
+              <a:cs typeface="Segoe UI" panose="020B0502040204020203" pitchFamily="34" charset="0"/>
+            </a:endParaRPr>
+          </a:p>
+        </p:txBody>
+      </p:sp>
+      <p:sp>
+        <p:nvSpPr>
+          <p:cNvPr id="9" name="Rectangle 8">
+            <a:extLst>
+              <a:ext uri="{FF2B5EF4-FFF2-40B4-BE49-F238E27FC236}">
+                <a16:creationId xmlns:a16="http://schemas.microsoft.com/office/drawing/2014/main" id="{CBF3F073-DB5A-53B0-8BCE-7E3F53349958}"/>
+              </a:ext>
+            </a:extLst>
+          </p:cNvPr>
+          <p:cNvSpPr/>
+          <p:nvPr/>
+        </p:nvSpPr>
+        <p:spPr>
+          <a:xfrm>
+            <a:off x="367645" y="970961"/>
+            <a:ext cx="11462995" cy="5495827"/>
+          </a:xfrm>
+          <a:prstGeom prst="rect">
+            <a:avLst/>
+          </a:prstGeom>
+          <a:noFill/>
+          <a:ln w="9525" cap="flat" cmpd="sng" algn="ctr">
+            <a:solidFill>
+              <a:schemeClr val="accent3"/>
+            </a:solidFill>
+            <a:prstDash val="solid"/>
+            <a:round/>
+            <a:headEnd type="none" w="med" len="med"/>
+            <a:tailEnd type="none" w="med" len="med"/>
+          </a:ln>
+        </p:spPr>
+        <p:style>
+          <a:lnRef idx="0">
+            <a:scrgbClr r="0" g="0" b="0"/>
+          </a:lnRef>
+          <a:fillRef idx="0">
+            <a:scrgbClr r="0" g="0" b="0"/>
+          </a:fillRef>
+          <a:effectRef idx="0">
+            <a:scrgbClr r="0" g="0" b="0"/>
+          </a:effectRef>
+          <a:fontRef idx="minor">
+            <a:schemeClr val="accent3"/>
+          </a:fontRef>
+        </p:style>
+        <p:txBody>
+          <a:bodyPr rtlCol="0" anchor="ctr"/>
+          <a:lstStyle/>
+          <a:p>
+            <a:pPr algn="ctr"/>
+            <a:endParaRPr lang="en-IN" dirty="0"/>
+          </a:p>
+        </p:txBody>
+      </p:sp>
+    </p:spTree>
+    <p:extLst>
+      <p:ext uri="{BB962C8B-B14F-4D97-AF65-F5344CB8AC3E}">
+        <p14:creationId xmlns:p14="http://schemas.microsoft.com/office/powerpoint/2010/main" val="1974248963"/>
+      </p:ext>
+    </p:extLst>
+  </p:cSld>
+  <p:clrMapOvr>
+    <a:masterClrMapping/>
+  </p:clrMapOvr>
+</p:sld>
+</file>
+
 <file path=ppt/slides/slide2.xml><?xml version="1.0" encoding="utf-8"?>
 <p:sld xmlns:a="http://schemas.openxmlformats.org/drawingml/2006/main" xmlns:r="http://schemas.openxmlformats.org/officeDocument/2006/relationships" xmlns:p="http://schemas.openxmlformats.org/presentationml/2006/main">
   <p:cSld>
@@ -4461,6 +5410,1301 @@
     <p:extLst>
       <p:ext uri="{BB962C8B-B14F-4D97-AF65-F5344CB8AC3E}">
         <p14:creationId xmlns:p14="http://schemas.microsoft.com/office/powerpoint/2010/main" val="3236504711"/>
+      </p:ext>
+    </p:extLst>
+  </p:cSld>
+  <p:clrMapOvr>
+    <a:masterClrMapping/>
+  </p:clrMapOvr>
+</p:sld>
+</file>
+
+<file path=ppt/slides/slide7.xml><?xml version="1.0" encoding="utf-8"?>
+<p:sld xmlns:a="http://schemas.openxmlformats.org/drawingml/2006/main" xmlns:r="http://schemas.openxmlformats.org/officeDocument/2006/relationships" xmlns:p="http://schemas.openxmlformats.org/presentationml/2006/main">
+  <p:cSld>
+    <p:spTree>
+      <p:nvGrpSpPr>
+        <p:cNvPr id="1" name=""/>
+        <p:cNvGrpSpPr/>
+        <p:nvPr/>
+      </p:nvGrpSpPr>
+      <p:grpSpPr>
+        <a:xfrm>
+          <a:off x="0" y="0"/>
+          <a:ext cx="0" cy="0"/>
+          <a:chOff x="0" y="0"/>
+          <a:chExt cx="0" cy="0"/>
+        </a:xfrm>
+      </p:grpSpPr>
+      <p:sp>
+        <p:nvSpPr>
+          <p:cNvPr id="2" name="TextBox 1">
+            <a:extLst>
+              <a:ext uri="{FF2B5EF4-FFF2-40B4-BE49-F238E27FC236}">
+                <a16:creationId xmlns:a16="http://schemas.microsoft.com/office/drawing/2014/main" id="{2C265965-136C-12A1-055A-8C1D00DA0493}"/>
+              </a:ext>
+            </a:extLst>
+          </p:cNvPr>
+          <p:cNvSpPr txBox="1"/>
+          <p:nvPr/>
+        </p:nvSpPr>
+        <p:spPr>
+          <a:xfrm>
+            <a:off x="4027332" y="303322"/>
+            <a:ext cx="4613748" cy="646331"/>
+          </a:xfrm>
+          <a:prstGeom prst="rect">
+            <a:avLst/>
+          </a:prstGeom>
+          <a:noFill/>
+        </p:spPr>
+        <p:txBody>
+          <a:bodyPr wrap="square" rtlCol="0">
+            <a:spAutoFit/>
+          </a:bodyPr>
+          <a:lstStyle/>
+          <a:p>
+            <a:r>
+              <a:rPr lang="en-IN" dirty="0"/>
+              <a:t>Update the Cache of the CloudFront distribution </a:t>
+            </a:r>
+          </a:p>
+        </p:txBody>
+      </p:sp>
+      <p:sp>
+        <p:nvSpPr>
+          <p:cNvPr id="3" name="Rectangle 2">
+            <a:extLst>
+              <a:ext uri="{FF2B5EF4-FFF2-40B4-BE49-F238E27FC236}">
+                <a16:creationId xmlns:a16="http://schemas.microsoft.com/office/drawing/2014/main" id="{A6AE37A1-9329-E66A-748C-E67F9664C20D}"/>
+              </a:ext>
+            </a:extLst>
+          </p:cNvPr>
+          <p:cNvSpPr/>
+          <p:nvPr/>
+        </p:nvSpPr>
+        <p:spPr>
+          <a:xfrm>
+            <a:off x="3453752" y="198089"/>
+            <a:ext cx="4613747" cy="751564"/>
+          </a:xfrm>
+          <a:prstGeom prst="rect">
+            <a:avLst/>
+          </a:prstGeom>
+          <a:solidFill>
+            <a:schemeClr val="accent4">
+              <a:alpha val="50000"/>
+            </a:schemeClr>
+          </a:solidFill>
+          <a:ln>
+            <a:noFill/>
+          </a:ln>
+        </p:spPr>
+        <p:style>
+          <a:lnRef idx="0">
+            <a:scrgbClr r="0" g="0" b="0"/>
+          </a:lnRef>
+          <a:fillRef idx="0">
+            <a:scrgbClr r="0" g="0" b="0"/>
+          </a:fillRef>
+          <a:effectRef idx="0">
+            <a:scrgbClr r="0" g="0" b="0"/>
+          </a:effectRef>
+          <a:fontRef idx="minor">
+            <a:schemeClr val="lt1"/>
+          </a:fontRef>
+        </p:style>
+        <p:txBody>
+          <a:bodyPr rtlCol="0" anchor="ctr"/>
+          <a:lstStyle/>
+          <a:p>
+            <a:pPr algn="ctr"/>
+            <a:endParaRPr lang="en-IN" dirty="0"/>
+          </a:p>
+        </p:txBody>
+      </p:sp>
+      <p:sp>
+        <p:nvSpPr>
+          <p:cNvPr id="7" name="Rectangle 6">
+            <a:extLst>
+              <a:ext uri="{FF2B5EF4-FFF2-40B4-BE49-F238E27FC236}">
+                <a16:creationId xmlns:a16="http://schemas.microsoft.com/office/drawing/2014/main" id="{C2B2A8F1-8D21-214D-E9FF-F7781E10252B}"/>
+              </a:ext>
+            </a:extLst>
+          </p:cNvPr>
+          <p:cNvSpPr/>
+          <p:nvPr/>
+        </p:nvSpPr>
+        <p:spPr>
+          <a:xfrm>
+            <a:off x="786384" y="1627632"/>
+            <a:ext cx="10113264" cy="4416552"/>
+          </a:xfrm>
+          <a:prstGeom prst="rect">
+            <a:avLst/>
+          </a:prstGeom>
+          <a:noFill/>
+          <a:ln w="9525" cap="flat" cmpd="sng" algn="ctr">
+            <a:solidFill>
+              <a:schemeClr val="accent3"/>
+            </a:solidFill>
+            <a:prstDash val="solid"/>
+            <a:round/>
+            <a:headEnd type="none" w="med" len="med"/>
+            <a:tailEnd type="none" w="med" len="med"/>
+          </a:ln>
+        </p:spPr>
+        <p:style>
+          <a:lnRef idx="0">
+            <a:scrgbClr r="0" g="0" b="0"/>
+          </a:lnRef>
+          <a:fillRef idx="0">
+            <a:scrgbClr r="0" g="0" b="0"/>
+          </a:fillRef>
+          <a:effectRef idx="0">
+            <a:scrgbClr r="0" g="0" b="0"/>
+          </a:effectRef>
+          <a:fontRef idx="minor">
+            <a:schemeClr val="accent3"/>
+          </a:fontRef>
+        </p:style>
+        <p:txBody>
+          <a:bodyPr rtlCol="0" anchor="ctr"/>
+          <a:lstStyle/>
+          <a:p>
+            <a:pPr algn="ctr"/>
+            <a:endParaRPr lang="en-IN" dirty="0"/>
+          </a:p>
+        </p:txBody>
+      </p:sp>
+      <p:sp>
+        <p:nvSpPr>
+          <p:cNvPr id="9" name="TextBox 8">
+            <a:extLst>
+              <a:ext uri="{FF2B5EF4-FFF2-40B4-BE49-F238E27FC236}">
+                <a16:creationId xmlns:a16="http://schemas.microsoft.com/office/drawing/2014/main" id="{FD2B7669-511A-9559-4DA0-7E67D1511731}"/>
+              </a:ext>
+            </a:extLst>
+          </p:cNvPr>
+          <p:cNvSpPr txBox="1"/>
+          <p:nvPr/>
+        </p:nvSpPr>
+        <p:spPr>
+          <a:xfrm>
+            <a:off x="1078992" y="2347589"/>
+            <a:ext cx="9528048" cy="3226204"/>
+          </a:xfrm>
+          <a:prstGeom prst="rect">
+            <a:avLst/>
+          </a:prstGeom>
+          <a:noFill/>
+        </p:spPr>
+        <p:txBody>
+          <a:bodyPr wrap="square">
+            <a:spAutoFit/>
+          </a:bodyPr>
+          <a:lstStyle/>
+          <a:p>
+            <a:pPr algn="l"/>
+            <a:r>
+              <a:rPr lang="en-US" b="1" i="0" dirty="0">
+                <a:solidFill>
+                  <a:srgbClr val="0D0D0D"/>
+                </a:solidFill>
+                <a:effectLst/>
+                <a:highlight>
+                  <a:srgbClr val="FFFFFF"/>
+                </a:highlight>
+                <a:latin typeface="Segoe UI" panose="020B0502040204020203" pitchFamily="34" charset="0"/>
+                <a:cs typeface="Segoe UI" panose="020B0502040204020203" pitchFamily="34" charset="0"/>
+              </a:rPr>
+              <a:t>Step 1: Set Up an S3 Bucket</a:t>
+            </a:r>
+          </a:p>
+          <a:p>
+            <a:pPr algn="l"/>
+            <a:r>
+              <a:rPr lang="en-US" b="0" i="0" dirty="0">
+                <a:solidFill>
+                  <a:srgbClr val="0D0D0D"/>
+                </a:solidFill>
+                <a:effectLst/>
+                <a:highlight>
+                  <a:srgbClr val="FFFFFF"/>
+                </a:highlight>
+                <a:latin typeface="Segoe UI" panose="020B0502040204020203" pitchFamily="34" charset="0"/>
+                <a:cs typeface="Segoe UI" panose="020B0502040204020203" pitchFamily="34" charset="0"/>
+              </a:rPr>
+              <a:t>Assuming you already have an S3 bucket where HLS files are stored, ensure it’s correctly configured to store your HLS files. If not, follow these steps to create one:</a:t>
+            </a:r>
+            <a:endParaRPr lang="en-US" dirty="0">
+              <a:solidFill>
+                <a:srgbClr val="0D0D0D"/>
+              </a:solidFill>
+              <a:highlight>
+                <a:srgbClr val="FFFFFF"/>
+              </a:highlight>
+              <a:latin typeface="Segoe UI" panose="020B0502040204020203" pitchFamily="34" charset="0"/>
+              <a:cs typeface="Segoe UI" panose="020B0502040204020203" pitchFamily="34" charset="0"/>
+            </a:endParaRPr>
+          </a:p>
+          <a:p>
+            <a:pPr algn="l"/>
+            <a:endParaRPr lang="en-US" b="0" i="0" dirty="0">
+              <a:solidFill>
+                <a:srgbClr val="0D0D0D"/>
+              </a:solidFill>
+              <a:effectLst/>
+              <a:highlight>
+                <a:srgbClr val="FFFFFF"/>
+              </a:highlight>
+              <a:latin typeface="Segoe UI" panose="020B0502040204020203" pitchFamily="34" charset="0"/>
+              <a:cs typeface="Segoe UI" panose="020B0502040204020203" pitchFamily="34" charset="0"/>
+            </a:endParaRPr>
+          </a:p>
+          <a:p>
+            <a:pPr marL="342900" indent="-342900" algn="l">
+              <a:lnSpc>
+                <a:spcPct val="150000"/>
+              </a:lnSpc>
+              <a:buFont typeface="+mj-lt"/>
+              <a:buAutoNum type="arabicPeriod"/>
+            </a:pPr>
+            <a:r>
+              <a:rPr lang="en-US" b="1" i="0" dirty="0">
+                <a:solidFill>
+                  <a:srgbClr val="0D0D0D"/>
+                </a:solidFill>
+                <a:effectLst/>
+                <a:highlight>
+                  <a:srgbClr val="FFFFFF"/>
+                </a:highlight>
+                <a:latin typeface="Segoe UI" panose="020B0502040204020203" pitchFamily="34" charset="0"/>
+                <a:cs typeface="Segoe UI" panose="020B0502040204020203" pitchFamily="34" charset="0"/>
+              </a:rPr>
+              <a:t>Log in</a:t>
+            </a:r>
+            <a:r>
+              <a:rPr lang="en-US" b="0" i="0" dirty="0">
+                <a:solidFill>
+                  <a:srgbClr val="0D0D0D"/>
+                </a:solidFill>
+                <a:effectLst/>
+                <a:highlight>
+                  <a:srgbClr val="FFFFFF"/>
+                </a:highlight>
+                <a:latin typeface="Segoe UI" panose="020B0502040204020203" pitchFamily="34" charset="0"/>
+                <a:cs typeface="Segoe UI" panose="020B0502040204020203" pitchFamily="34" charset="0"/>
+              </a:rPr>
+              <a:t> to the AWS Management Console.</a:t>
+            </a:r>
+          </a:p>
+          <a:p>
+            <a:pPr marL="342900" indent="-342900" algn="l">
+              <a:lnSpc>
+                <a:spcPct val="150000"/>
+              </a:lnSpc>
+              <a:buFont typeface="+mj-lt"/>
+              <a:buAutoNum type="arabicPeriod"/>
+            </a:pPr>
+            <a:r>
+              <a:rPr lang="en-US" b="0" i="0" dirty="0">
+                <a:solidFill>
+                  <a:srgbClr val="0D0D0D"/>
+                </a:solidFill>
+                <a:effectLst/>
+                <a:highlight>
+                  <a:srgbClr val="FFFFFF"/>
+                </a:highlight>
+                <a:latin typeface="Segoe UI" panose="020B0502040204020203" pitchFamily="34" charset="0"/>
+                <a:cs typeface="Segoe UI" panose="020B0502040204020203" pitchFamily="34" charset="0"/>
+              </a:rPr>
+              <a:t>Navigate to the </a:t>
+            </a:r>
+            <a:r>
+              <a:rPr lang="en-US" b="1" i="0" dirty="0">
+                <a:solidFill>
+                  <a:srgbClr val="0D0D0D"/>
+                </a:solidFill>
+                <a:effectLst/>
+                <a:highlight>
+                  <a:srgbClr val="FFFFFF"/>
+                </a:highlight>
+                <a:latin typeface="Segoe UI" panose="020B0502040204020203" pitchFamily="34" charset="0"/>
+                <a:cs typeface="Segoe UI" panose="020B0502040204020203" pitchFamily="34" charset="0"/>
+              </a:rPr>
+              <a:t>S3 service</a:t>
+            </a:r>
+            <a:r>
+              <a:rPr lang="en-US" b="0" i="0" dirty="0">
+                <a:solidFill>
+                  <a:srgbClr val="0D0D0D"/>
+                </a:solidFill>
+                <a:effectLst/>
+                <a:highlight>
+                  <a:srgbClr val="FFFFFF"/>
+                </a:highlight>
+                <a:latin typeface="Segoe UI" panose="020B0502040204020203" pitchFamily="34" charset="0"/>
+                <a:cs typeface="Segoe UI" panose="020B0502040204020203" pitchFamily="34" charset="0"/>
+              </a:rPr>
+              <a:t> and click </a:t>
+            </a:r>
+            <a:r>
+              <a:rPr lang="en-US" b="1" i="0" dirty="0">
+                <a:solidFill>
+                  <a:srgbClr val="0D0D0D"/>
+                </a:solidFill>
+                <a:effectLst/>
+                <a:highlight>
+                  <a:srgbClr val="FFFFFF"/>
+                </a:highlight>
+                <a:latin typeface="Segoe UI" panose="020B0502040204020203" pitchFamily="34" charset="0"/>
+                <a:cs typeface="Segoe UI" panose="020B0502040204020203" pitchFamily="34" charset="0"/>
+              </a:rPr>
+              <a:t>Create bucket</a:t>
+            </a:r>
+            <a:r>
+              <a:rPr lang="en-US" b="0" i="0" dirty="0">
+                <a:solidFill>
+                  <a:srgbClr val="0D0D0D"/>
+                </a:solidFill>
+                <a:effectLst/>
+                <a:highlight>
+                  <a:srgbClr val="FFFFFF"/>
+                </a:highlight>
+                <a:latin typeface="Segoe UI" panose="020B0502040204020203" pitchFamily="34" charset="0"/>
+                <a:cs typeface="Segoe UI" panose="020B0502040204020203" pitchFamily="34" charset="0"/>
+              </a:rPr>
+              <a:t>.</a:t>
+            </a:r>
+          </a:p>
+          <a:p>
+            <a:pPr marL="342900" indent="-342900" algn="l">
+              <a:lnSpc>
+                <a:spcPct val="150000"/>
+              </a:lnSpc>
+              <a:buFont typeface="+mj-lt"/>
+              <a:buAutoNum type="arabicPeriod"/>
+            </a:pPr>
+            <a:r>
+              <a:rPr lang="en-US" b="0" i="0" dirty="0">
+                <a:solidFill>
+                  <a:srgbClr val="0D0D0D"/>
+                </a:solidFill>
+                <a:effectLst/>
+                <a:highlight>
+                  <a:srgbClr val="FFFFFF"/>
+                </a:highlight>
+                <a:latin typeface="Segoe UI" panose="020B0502040204020203" pitchFamily="34" charset="0"/>
+                <a:cs typeface="Segoe UI" panose="020B0502040204020203" pitchFamily="34" charset="0"/>
+              </a:rPr>
+              <a:t>Enter a </a:t>
+            </a:r>
+            <a:r>
+              <a:rPr lang="en-US" b="1" i="0" dirty="0">
+                <a:solidFill>
+                  <a:srgbClr val="0D0D0D"/>
+                </a:solidFill>
+                <a:effectLst/>
+                <a:highlight>
+                  <a:srgbClr val="FFFFFF"/>
+                </a:highlight>
+                <a:latin typeface="Segoe UI" panose="020B0502040204020203" pitchFamily="34" charset="0"/>
+                <a:cs typeface="Segoe UI" panose="020B0502040204020203" pitchFamily="34" charset="0"/>
+              </a:rPr>
+              <a:t>bucket name</a:t>
+            </a:r>
+            <a:r>
+              <a:rPr lang="en-US" b="0" i="0" dirty="0">
+                <a:solidFill>
+                  <a:srgbClr val="0D0D0D"/>
+                </a:solidFill>
+                <a:effectLst/>
+                <a:highlight>
+                  <a:srgbClr val="FFFFFF"/>
+                </a:highlight>
+                <a:latin typeface="Segoe UI" panose="020B0502040204020203" pitchFamily="34" charset="0"/>
+                <a:cs typeface="Segoe UI" panose="020B0502040204020203" pitchFamily="34" charset="0"/>
+              </a:rPr>
+              <a:t> and select the </a:t>
+            </a:r>
+            <a:r>
+              <a:rPr lang="en-US" b="1" i="0" dirty="0">
+                <a:solidFill>
+                  <a:srgbClr val="0D0D0D"/>
+                </a:solidFill>
+                <a:effectLst/>
+                <a:highlight>
+                  <a:srgbClr val="FFFFFF"/>
+                </a:highlight>
+                <a:latin typeface="Segoe UI" panose="020B0502040204020203" pitchFamily="34" charset="0"/>
+                <a:cs typeface="Segoe UI" panose="020B0502040204020203" pitchFamily="34" charset="0"/>
+              </a:rPr>
+              <a:t>region</a:t>
+            </a:r>
+            <a:r>
+              <a:rPr lang="en-US" b="0" i="0" dirty="0">
+                <a:solidFill>
+                  <a:srgbClr val="0D0D0D"/>
+                </a:solidFill>
+                <a:effectLst/>
+                <a:highlight>
+                  <a:srgbClr val="FFFFFF"/>
+                </a:highlight>
+                <a:latin typeface="Segoe UI" panose="020B0502040204020203" pitchFamily="34" charset="0"/>
+                <a:cs typeface="Segoe UI" panose="020B0502040204020203" pitchFamily="34" charset="0"/>
+              </a:rPr>
+              <a:t>.</a:t>
+            </a:r>
+          </a:p>
+          <a:p>
+            <a:pPr marL="342900" indent="-342900" algn="l">
+              <a:lnSpc>
+                <a:spcPct val="150000"/>
+              </a:lnSpc>
+              <a:buFont typeface="+mj-lt"/>
+              <a:buAutoNum type="arabicPeriod"/>
+            </a:pPr>
+            <a:r>
+              <a:rPr lang="en-US" b="0" i="0" dirty="0">
+                <a:solidFill>
+                  <a:srgbClr val="0D0D0D"/>
+                </a:solidFill>
+                <a:effectLst/>
+                <a:highlight>
+                  <a:srgbClr val="FFFFFF"/>
+                </a:highlight>
+                <a:latin typeface="Segoe UI" panose="020B0502040204020203" pitchFamily="34" charset="0"/>
+                <a:cs typeface="Segoe UI" panose="020B0502040204020203" pitchFamily="34" charset="0"/>
+              </a:rPr>
+              <a:t>Leave all other settings as default or configure them according to your organizational policies and click </a:t>
+            </a:r>
+            <a:r>
+              <a:rPr lang="en-US" b="1" i="0" dirty="0">
+                <a:solidFill>
+                  <a:srgbClr val="0D0D0D"/>
+                </a:solidFill>
+                <a:effectLst/>
+                <a:highlight>
+                  <a:srgbClr val="FFFFFF"/>
+                </a:highlight>
+                <a:latin typeface="Segoe UI" panose="020B0502040204020203" pitchFamily="34" charset="0"/>
+                <a:cs typeface="Segoe UI" panose="020B0502040204020203" pitchFamily="34" charset="0"/>
+              </a:rPr>
+              <a:t>Create</a:t>
+            </a:r>
+            <a:r>
+              <a:rPr lang="en-US" b="0" i="0" dirty="0">
+                <a:solidFill>
+                  <a:srgbClr val="0D0D0D"/>
+                </a:solidFill>
+                <a:effectLst/>
+                <a:highlight>
+                  <a:srgbClr val="FFFFFF"/>
+                </a:highlight>
+                <a:latin typeface="Segoe UI" panose="020B0502040204020203" pitchFamily="34" charset="0"/>
+                <a:cs typeface="Segoe UI" panose="020B0502040204020203" pitchFamily="34" charset="0"/>
+              </a:rPr>
+              <a:t>.</a:t>
+            </a:r>
+          </a:p>
+        </p:txBody>
+      </p:sp>
+    </p:spTree>
+    <p:extLst>
+      <p:ext uri="{BB962C8B-B14F-4D97-AF65-F5344CB8AC3E}">
+        <p14:creationId xmlns:p14="http://schemas.microsoft.com/office/powerpoint/2010/main" val="214932322"/>
+      </p:ext>
+    </p:extLst>
+  </p:cSld>
+  <p:clrMapOvr>
+    <a:masterClrMapping/>
+  </p:clrMapOvr>
+</p:sld>
+</file>
+
+<file path=ppt/slides/slide8.xml><?xml version="1.0" encoding="utf-8"?>
+<p:sld xmlns:a="http://schemas.openxmlformats.org/drawingml/2006/main" xmlns:r="http://schemas.openxmlformats.org/officeDocument/2006/relationships" xmlns:p="http://schemas.openxmlformats.org/presentationml/2006/main">
+  <p:cSld>
+    <p:spTree>
+      <p:nvGrpSpPr>
+        <p:cNvPr id="1" name=""/>
+        <p:cNvGrpSpPr/>
+        <p:nvPr/>
+      </p:nvGrpSpPr>
+      <p:grpSpPr>
+        <a:xfrm>
+          <a:off x="0" y="0"/>
+          <a:ext cx="0" cy="0"/>
+          <a:chOff x="0" y="0"/>
+          <a:chExt cx="0" cy="0"/>
+        </a:xfrm>
+      </p:grpSpPr>
+      <p:sp>
+        <p:nvSpPr>
+          <p:cNvPr id="2" name="TextBox 1">
+            <a:extLst>
+              <a:ext uri="{FF2B5EF4-FFF2-40B4-BE49-F238E27FC236}">
+                <a16:creationId xmlns:a16="http://schemas.microsoft.com/office/drawing/2014/main" id="{2C265965-136C-12A1-055A-8C1D00DA0493}"/>
+              </a:ext>
+            </a:extLst>
+          </p:cNvPr>
+          <p:cNvSpPr txBox="1"/>
+          <p:nvPr/>
+        </p:nvSpPr>
+        <p:spPr>
+          <a:xfrm>
+            <a:off x="4027332" y="303322"/>
+            <a:ext cx="4613748" cy="646331"/>
+          </a:xfrm>
+          <a:prstGeom prst="rect">
+            <a:avLst/>
+          </a:prstGeom>
+          <a:noFill/>
+        </p:spPr>
+        <p:txBody>
+          <a:bodyPr wrap="square" rtlCol="0">
+            <a:spAutoFit/>
+          </a:bodyPr>
+          <a:lstStyle/>
+          <a:p>
+            <a:r>
+              <a:rPr lang="en-IN" dirty="0"/>
+              <a:t>Update the Cache of the CloudFront distribution </a:t>
+            </a:r>
+          </a:p>
+        </p:txBody>
+      </p:sp>
+      <p:sp>
+        <p:nvSpPr>
+          <p:cNvPr id="3" name="Rectangle 2">
+            <a:extLst>
+              <a:ext uri="{FF2B5EF4-FFF2-40B4-BE49-F238E27FC236}">
+                <a16:creationId xmlns:a16="http://schemas.microsoft.com/office/drawing/2014/main" id="{A6AE37A1-9329-E66A-748C-E67F9664C20D}"/>
+              </a:ext>
+            </a:extLst>
+          </p:cNvPr>
+          <p:cNvSpPr/>
+          <p:nvPr/>
+        </p:nvSpPr>
+        <p:spPr>
+          <a:xfrm>
+            <a:off x="3453752" y="198089"/>
+            <a:ext cx="4613747" cy="751564"/>
+          </a:xfrm>
+          <a:prstGeom prst="rect">
+            <a:avLst/>
+          </a:prstGeom>
+          <a:solidFill>
+            <a:schemeClr val="accent4">
+              <a:alpha val="50000"/>
+            </a:schemeClr>
+          </a:solidFill>
+          <a:ln>
+            <a:noFill/>
+          </a:ln>
+        </p:spPr>
+        <p:style>
+          <a:lnRef idx="0">
+            <a:scrgbClr r="0" g="0" b="0"/>
+          </a:lnRef>
+          <a:fillRef idx="0">
+            <a:scrgbClr r="0" g="0" b="0"/>
+          </a:fillRef>
+          <a:effectRef idx="0">
+            <a:scrgbClr r="0" g="0" b="0"/>
+          </a:effectRef>
+          <a:fontRef idx="minor">
+            <a:schemeClr val="lt1"/>
+          </a:fontRef>
+        </p:style>
+        <p:txBody>
+          <a:bodyPr rtlCol="0" anchor="ctr"/>
+          <a:lstStyle/>
+          <a:p>
+            <a:pPr algn="ctr"/>
+            <a:endParaRPr lang="en-IN" dirty="0"/>
+          </a:p>
+        </p:txBody>
+      </p:sp>
+      <p:sp>
+        <p:nvSpPr>
+          <p:cNvPr id="7" name="Rectangle 6">
+            <a:extLst>
+              <a:ext uri="{FF2B5EF4-FFF2-40B4-BE49-F238E27FC236}">
+                <a16:creationId xmlns:a16="http://schemas.microsoft.com/office/drawing/2014/main" id="{C2B2A8F1-8D21-214D-E9FF-F7781E10252B}"/>
+              </a:ext>
+            </a:extLst>
+          </p:cNvPr>
+          <p:cNvSpPr/>
+          <p:nvPr/>
+        </p:nvSpPr>
+        <p:spPr>
+          <a:xfrm>
+            <a:off x="786384" y="1527048"/>
+            <a:ext cx="10323576" cy="4517136"/>
+          </a:xfrm>
+          <a:prstGeom prst="rect">
+            <a:avLst/>
+          </a:prstGeom>
+          <a:noFill/>
+          <a:ln w="9525" cap="flat" cmpd="sng" algn="ctr">
+            <a:solidFill>
+              <a:schemeClr val="accent3"/>
+            </a:solidFill>
+            <a:prstDash val="solid"/>
+            <a:round/>
+            <a:headEnd type="none" w="med" len="med"/>
+            <a:tailEnd type="none" w="med" len="med"/>
+          </a:ln>
+        </p:spPr>
+        <p:style>
+          <a:lnRef idx="0">
+            <a:scrgbClr r="0" g="0" b="0"/>
+          </a:lnRef>
+          <a:fillRef idx="0">
+            <a:scrgbClr r="0" g="0" b="0"/>
+          </a:fillRef>
+          <a:effectRef idx="0">
+            <a:scrgbClr r="0" g="0" b="0"/>
+          </a:effectRef>
+          <a:fontRef idx="minor">
+            <a:schemeClr val="accent3"/>
+          </a:fontRef>
+        </p:style>
+        <p:txBody>
+          <a:bodyPr rtlCol="0" anchor="ctr"/>
+          <a:lstStyle/>
+          <a:p>
+            <a:pPr algn="ctr"/>
+            <a:endParaRPr lang="en-IN" dirty="0"/>
+          </a:p>
+        </p:txBody>
+      </p:sp>
+      <p:sp>
+        <p:nvSpPr>
+          <p:cNvPr id="9" name="TextBox 8">
+            <a:extLst>
+              <a:ext uri="{FF2B5EF4-FFF2-40B4-BE49-F238E27FC236}">
+                <a16:creationId xmlns:a16="http://schemas.microsoft.com/office/drawing/2014/main" id="{462B08DF-1487-EE23-6FE4-3E74FC75CC10}"/>
+              </a:ext>
+            </a:extLst>
+          </p:cNvPr>
+          <p:cNvSpPr txBox="1"/>
+          <p:nvPr/>
+        </p:nvSpPr>
+        <p:spPr>
+          <a:xfrm>
+            <a:off x="1082040" y="2185416"/>
+            <a:ext cx="9595104" cy="2949205"/>
+          </a:xfrm>
+          <a:prstGeom prst="rect">
+            <a:avLst/>
+          </a:prstGeom>
+          <a:noFill/>
+        </p:spPr>
+        <p:txBody>
+          <a:bodyPr wrap="square">
+            <a:spAutoFit/>
+          </a:bodyPr>
+          <a:lstStyle/>
+          <a:p>
+            <a:pPr algn="l">
+              <a:lnSpc>
+                <a:spcPct val="150000"/>
+              </a:lnSpc>
+            </a:pPr>
+            <a:r>
+              <a:rPr lang="en-US" b="1" i="0" dirty="0">
+                <a:solidFill>
+                  <a:srgbClr val="0D0D0D"/>
+                </a:solidFill>
+                <a:effectLst/>
+                <a:highlight>
+                  <a:srgbClr val="FFFFFF"/>
+                </a:highlight>
+                <a:latin typeface="Segoe UI" panose="020B0502040204020203" pitchFamily="34" charset="0"/>
+                <a:cs typeface="Segoe UI" panose="020B0502040204020203" pitchFamily="34" charset="0"/>
+              </a:rPr>
+              <a:t>Step 2: Create a Lambda Function</a:t>
+            </a:r>
+          </a:p>
+          <a:p>
+            <a:pPr marL="342900" indent="-342900" algn="l">
+              <a:lnSpc>
+                <a:spcPct val="150000"/>
+              </a:lnSpc>
+              <a:buFont typeface="+mj-lt"/>
+              <a:buAutoNum type="arabicPeriod"/>
+            </a:pPr>
+            <a:r>
+              <a:rPr lang="en-US" b="1" i="0" dirty="0">
+                <a:solidFill>
+                  <a:srgbClr val="0D0D0D"/>
+                </a:solidFill>
+                <a:effectLst/>
+                <a:highlight>
+                  <a:srgbClr val="FFFFFF"/>
+                </a:highlight>
+                <a:latin typeface="Segoe UI" panose="020B0502040204020203" pitchFamily="34" charset="0"/>
+                <a:cs typeface="Segoe UI" panose="020B0502040204020203" pitchFamily="34" charset="0"/>
+              </a:rPr>
+              <a:t>Navigate</a:t>
+            </a:r>
+            <a:r>
+              <a:rPr lang="en-US" b="0" i="0" dirty="0">
+                <a:solidFill>
+                  <a:srgbClr val="0D0D0D"/>
+                </a:solidFill>
+                <a:effectLst/>
+                <a:highlight>
+                  <a:srgbClr val="FFFFFF"/>
+                </a:highlight>
+                <a:latin typeface="Segoe UI" panose="020B0502040204020203" pitchFamily="34" charset="0"/>
+                <a:cs typeface="Segoe UI" panose="020B0502040204020203" pitchFamily="34" charset="0"/>
+              </a:rPr>
+              <a:t> to the AWS Lambda console and click the </a:t>
+            </a:r>
+            <a:r>
+              <a:rPr lang="en-US" b="1" i="0" dirty="0">
+                <a:solidFill>
+                  <a:srgbClr val="0D0D0D"/>
+                </a:solidFill>
+                <a:effectLst/>
+                <a:highlight>
+                  <a:srgbClr val="FFFFFF"/>
+                </a:highlight>
+                <a:latin typeface="Segoe UI" panose="020B0502040204020203" pitchFamily="34" charset="0"/>
+                <a:cs typeface="Segoe UI" panose="020B0502040204020203" pitchFamily="34" charset="0"/>
+              </a:rPr>
+              <a:t>Create function</a:t>
+            </a:r>
+            <a:r>
+              <a:rPr lang="en-US" b="0" i="0" dirty="0">
+                <a:solidFill>
+                  <a:srgbClr val="0D0D0D"/>
+                </a:solidFill>
+                <a:effectLst/>
+                <a:highlight>
+                  <a:srgbClr val="FFFFFF"/>
+                </a:highlight>
+                <a:latin typeface="Segoe UI" panose="020B0502040204020203" pitchFamily="34" charset="0"/>
+                <a:cs typeface="Segoe UI" panose="020B0502040204020203" pitchFamily="34" charset="0"/>
+              </a:rPr>
+              <a:t>.</a:t>
+            </a:r>
+          </a:p>
+          <a:p>
+            <a:pPr marL="342900" indent="-342900" algn="l">
+              <a:lnSpc>
+                <a:spcPct val="150000"/>
+              </a:lnSpc>
+              <a:buFont typeface="+mj-lt"/>
+              <a:buAutoNum type="arabicPeriod"/>
+            </a:pPr>
+            <a:r>
+              <a:rPr lang="en-US" b="0" i="0" dirty="0">
+                <a:solidFill>
+                  <a:srgbClr val="0D0D0D"/>
+                </a:solidFill>
+                <a:effectLst/>
+                <a:highlight>
+                  <a:srgbClr val="FFFFFF"/>
+                </a:highlight>
+                <a:latin typeface="Segoe UI" panose="020B0502040204020203" pitchFamily="34" charset="0"/>
+                <a:cs typeface="Segoe UI" panose="020B0502040204020203" pitchFamily="34" charset="0"/>
+              </a:rPr>
+              <a:t>Choose the </a:t>
+            </a:r>
+            <a:r>
+              <a:rPr lang="en-US" b="1" i="0" dirty="0">
+                <a:solidFill>
+                  <a:srgbClr val="0D0D0D"/>
+                </a:solidFill>
+                <a:effectLst/>
+                <a:highlight>
+                  <a:srgbClr val="FFFFFF"/>
+                </a:highlight>
+                <a:latin typeface="Segoe UI" panose="020B0502040204020203" pitchFamily="34" charset="0"/>
+                <a:cs typeface="Segoe UI" panose="020B0502040204020203" pitchFamily="34" charset="0"/>
+              </a:rPr>
+              <a:t>Author from scratch</a:t>
+            </a:r>
+            <a:r>
+              <a:rPr lang="en-US" b="0" i="0" dirty="0">
+                <a:solidFill>
+                  <a:srgbClr val="0D0D0D"/>
+                </a:solidFill>
+                <a:effectLst/>
+                <a:highlight>
+                  <a:srgbClr val="FFFFFF"/>
+                </a:highlight>
+                <a:latin typeface="Segoe UI" panose="020B0502040204020203" pitchFamily="34" charset="0"/>
+                <a:cs typeface="Segoe UI" panose="020B0502040204020203" pitchFamily="34" charset="0"/>
+              </a:rPr>
+              <a:t>. Enter a </a:t>
+            </a:r>
+            <a:r>
+              <a:rPr lang="en-US" b="1" i="0" dirty="0">
+                <a:solidFill>
+                  <a:srgbClr val="0D0D0D"/>
+                </a:solidFill>
+                <a:effectLst/>
+                <a:highlight>
+                  <a:srgbClr val="FFFFFF"/>
+                </a:highlight>
+                <a:latin typeface="Segoe UI" panose="020B0502040204020203" pitchFamily="34" charset="0"/>
+                <a:cs typeface="Segoe UI" panose="020B0502040204020203" pitchFamily="34" charset="0"/>
+              </a:rPr>
+              <a:t>function name</a:t>
+            </a:r>
+            <a:r>
+              <a:rPr lang="en-US" b="0" i="0" dirty="0">
+                <a:solidFill>
+                  <a:srgbClr val="0D0D0D"/>
+                </a:solidFill>
+                <a:effectLst/>
+                <a:highlight>
+                  <a:srgbClr val="FFFFFF"/>
+                </a:highlight>
+                <a:latin typeface="Segoe UI" panose="020B0502040204020203" pitchFamily="34" charset="0"/>
+                <a:cs typeface="Segoe UI" panose="020B0502040204020203" pitchFamily="34" charset="0"/>
+              </a:rPr>
+              <a:t>, and select </a:t>
+            </a:r>
+            <a:r>
+              <a:rPr lang="en-US" b="1" i="0" dirty="0">
+                <a:solidFill>
+                  <a:srgbClr val="0D0D0D"/>
+                </a:solidFill>
+                <a:effectLst/>
+                <a:highlight>
+                  <a:srgbClr val="FFFFFF"/>
+                </a:highlight>
+                <a:latin typeface="Segoe UI" panose="020B0502040204020203" pitchFamily="34" charset="0"/>
+                <a:cs typeface="Segoe UI" panose="020B0502040204020203" pitchFamily="34" charset="0"/>
+              </a:rPr>
+              <a:t>Python 3.8</a:t>
+            </a:r>
+            <a:r>
+              <a:rPr lang="en-US" b="0" i="0" dirty="0">
+                <a:solidFill>
+                  <a:srgbClr val="0D0D0D"/>
+                </a:solidFill>
+                <a:effectLst/>
+                <a:highlight>
+                  <a:srgbClr val="FFFFFF"/>
+                </a:highlight>
+                <a:latin typeface="Segoe UI" panose="020B0502040204020203" pitchFamily="34" charset="0"/>
+                <a:cs typeface="Segoe UI" panose="020B0502040204020203" pitchFamily="34" charset="0"/>
+              </a:rPr>
+              <a:t> as the runtime.</a:t>
+            </a:r>
+          </a:p>
+          <a:p>
+            <a:pPr marL="342900" indent="-342900" algn="l">
+              <a:lnSpc>
+                <a:spcPct val="150000"/>
+              </a:lnSpc>
+              <a:buFont typeface="+mj-lt"/>
+              <a:buAutoNum type="arabicPeriod"/>
+            </a:pPr>
+            <a:r>
+              <a:rPr lang="en-US" b="0" i="0" dirty="0">
+                <a:solidFill>
+                  <a:srgbClr val="0D0D0D"/>
+                </a:solidFill>
+                <a:effectLst/>
+                <a:highlight>
+                  <a:srgbClr val="FFFFFF"/>
+                </a:highlight>
+                <a:latin typeface="Segoe UI" panose="020B0502040204020203" pitchFamily="34" charset="0"/>
+                <a:cs typeface="Segoe UI" panose="020B0502040204020203" pitchFamily="34" charset="0"/>
+              </a:rPr>
+              <a:t>Under </a:t>
+            </a:r>
+            <a:r>
+              <a:rPr lang="en-US" b="1" i="0" dirty="0">
+                <a:solidFill>
+                  <a:srgbClr val="0D0D0D"/>
+                </a:solidFill>
+                <a:effectLst/>
+                <a:highlight>
+                  <a:srgbClr val="FFFFFF"/>
+                </a:highlight>
+                <a:latin typeface="Segoe UI" panose="020B0502040204020203" pitchFamily="34" charset="0"/>
+                <a:cs typeface="Segoe UI" panose="020B0502040204020203" pitchFamily="34" charset="0"/>
+              </a:rPr>
+              <a:t>Permissions</a:t>
+            </a:r>
+            <a:r>
+              <a:rPr lang="en-US" b="0" i="0" dirty="0">
+                <a:solidFill>
+                  <a:srgbClr val="0D0D0D"/>
+                </a:solidFill>
+                <a:effectLst/>
+                <a:highlight>
+                  <a:srgbClr val="FFFFFF"/>
+                </a:highlight>
+                <a:latin typeface="Segoe UI" panose="020B0502040204020203" pitchFamily="34" charset="0"/>
+                <a:cs typeface="Segoe UI" panose="020B0502040204020203" pitchFamily="34" charset="0"/>
+              </a:rPr>
+              <a:t>, choose or create an execution role that has at least the basic Lambda permissions plus permissions to read from S3 and invalidate CloudFront distributions.</a:t>
+            </a:r>
+          </a:p>
+          <a:p>
+            <a:pPr marL="342900" indent="-342900" algn="l">
+              <a:lnSpc>
+                <a:spcPct val="150000"/>
+              </a:lnSpc>
+              <a:buFont typeface="+mj-lt"/>
+              <a:buAutoNum type="arabicPeriod"/>
+            </a:pPr>
+            <a:r>
+              <a:rPr lang="en-US" b="0" i="0" dirty="0">
+                <a:solidFill>
+                  <a:srgbClr val="0D0D0D"/>
+                </a:solidFill>
+                <a:effectLst/>
+                <a:highlight>
+                  <a:srgbClr val="FFFFFF"/>
+                </a:highlight>
+                <a:latin typeface="Segoe UI" panose="020B0502040204020203" pitchFamily="34" charset="0"/>
+                <a:cs typeface="Segoe UI" panose="020B0502040204020203" pitchFamily="34" charset="0"/>
+              </a:rPr>
+              <a:t>Click the </a:t>
+            </a:r>
+            <a:r>
+              <a:rPr lang="en-US" b="1" i="0" dirty="0">
+                <a:solidFill>
+                  <a:srgbClr val="0D0D0D"/>
+                </a:solidFill>
+                <a:effectLst/>
+                <a:highlight>
+                  <a:srgbClr val="FFFFFF"/>
+                </a:highlight>
+                <a:latin typeface="Segoe UI" panose="020B0502040204020203" pitchFamily="34" charset="0"/>
+                <a:cs typeface="Segoe UI" panose="020B0502040204020203" pitchFamily="34" charset="0"/>
+              </a:rPr>
+              <a:t>Create function</a:t>
+            </a:r>
+            <a:r>
+              <a:rPr lang="en-US" b="0" i="0" dirty="0">
+                <a:solidFill>
+                  <a:srgbClr val="0D0D0D"/>
+                </a:solidFill>
+                <a:effectLst/>
+                <a:highlight>
+                  <a:srgbClr val="FFFFFF"/>
+                </a:highlight>
+                <a:latin typeface="Segoe UI" panose="020B0502040204020203" pitchFamily="34" charset="0"/>
+                <a:cs typeface="Segoe UI" panose="020B0502040204020203" pitchFamily="34" charset="0"/>
+              </a:rPr>
+              <a:t>.</a:t>
+            </a:r>
+          </a:p>
+        </p:txBody>
+      </p:sp>
+    </p:spTree>
+    <p:extLst>
+      <p:ext uri="{BB962C8B-B14F-4D97-AF65-F5344CB8AC3E}">
+        <p14:creationId xmlns:p14="http://schemas.microsoft.com/office/powerpoint/2010/main" val="841529581"/>
+      </p:ext>
+    </p:extLst>
+  </p:cSld>
+  <p:clrMapOvr>
+    <a:masterClrMapping/>
+  </p:clrMapOvr>
+</p:sld>
+</file>
+
+<file path=ppt/slides/slide9.xml><?xml version="1.0" encoding="utf-8"?>
+<p:sld xmlns:a="http://schemas.openxmlformats.org/drawingml/2006/main" xmlns:r="http://schemas.openxmlformats.org/officeDocument/2006/relationships" xmlns:p="http://schemas.openxmlformats.org/presentationml/2006/main">
+  <p:cSld>
+    <p:spTree>
+      <p:nvGrpSpPr>
+        <p:cNvPr id="1" name=""/>
+        <p:cNvGrpSpPr/>
+        <p:nvPr/>
+      </p:nvGrpSpPr>
+      <p:grpSpPr>
+        <a:xfrm>
+          <a:off x="0" y="0"/>
+          <a:ext cx="0" cy="0"/>
+          <a:chOff x="0" y="0"/>
+          <a:chExt cx="0" cy="0"/>
+        </a:xfrm>
+      </p:grpSpPr>
+      <p:sp>
+        <p:nvSpPr>
+          <p:cNvPr id="2" name="TextBox 1">
+            <a:extLst>
+              <a:ext uri="{FF2B5EF4-FFF2-40B4-BE49-F238E27FC236}">
+                <a16:creationId xmlns:a16="http://schemas.microsoft.com/office/drawing/2014/main" id="{2C265965-136C-12A1-055A-8C1D00DA0493}"/>
+              </a:ext>
+            </a:extLst>
+          </p:cNvPr>
+          <p:cNvSpPr txBox="1"/>
+          <p:nvPr/>
+        </p:nvSpPr>
+        <p:spPr>
+          <a:xfrm>
+            <a:off x="4027332" y="303322"/>
+            <a:ext cx="4613748" cy="646331"/>
+          </a:xfrm>
+          <a:prstGeom prst="rect">
+            <a:avLst/>
+          </a:prstGeom>
+          <a:noFill/>
+        </p:spPr>
+        <p:txBody>
+          <a:bodyPr wrap="square" rtlCol="0">
+            <a:spAutoFit/>
+          </a:bodyPr>
+          <a:lstStyle/>
+          <a:p>
+            <a:r>
+              <a:rPr lang="en-IN" dirty="0"/>
+              <a:t>Update the Cache of the CloudFront distribution </a:t>
+            </a:r>
+          </a:p>
+        </p:txBody>
+      </p:sp>
+      <p:sp>
+        <p:nvSpPr>
+          <p:cNvPr id="3" name="Rectangle 2">
+            <a:extLst>
+              <a:ext uri="{FF2B5EF4-FFF2-40B4-BE49-F238E27FC236}">
+                <a16:creationId xmlns:a16="http://schemas.microsoft.com/office/drawing/2014/main" id="{A6AE37A1-9329-E66A-748C-E67F9664C20D}"/>
+              </a:ext>
+            </a:extLst>
+          </p:cNvPr>
+          <p:cNvSpPr/>
+          <p:nvPr/>
+        </p:nvSpPr>
+        <p:spPr>
+          <a:xfrm>
+            <a:off x="3453752" y="198089"/>
+            <a:ext cx="4613747" cy="751564"/>
+          </a:xfrm>
+          <a:prstGeom prst="rect">
+            <a:avLst/>
+          </a:prstGeom>
+          <a:solidFill>
+            <a:schemeClr val="accent4">
+              <a:alpha val="50000"/>
+            </a:schemeClr>
+          </a:solidFill>
+          <a:ln>
+            <a:noFill/>
+          </a:ln>
+        </p:spPr>
+        <p:style>
+          <a:lnRef idx="0">
+            <a:scrgbClr r="0" g="0" b="0"/>
+          </a:lnRef>
+          <a:fillRef idx="0">
+            <a:scrgbClr r="0" g="0" b="0"/>
+          </a:fillRef>
+          <a:effectRef idx="0">
+            <a:scrgbClr r="0" g="0" b="0"/>
+          </a:effectRef>
+          <a:fontRef idx="minor">
+            <a:schemeClr val="lt1"/>
+          </a:fontRef>
+        </p:style>
+        <p:txBody>
+          <a:bodyPr rtlCol="0" anchor="ctr"/>
+          <a:lstStyle/>
+          <a:p>
+            <a:pPr algn="ctr"/>
+            <a:endParaRPr lang="en-IN" dirty="0"/>
+          </a:p>
+        </p:txBody>
+      </p:sp>
+      <p:sp>
+        <p:nvSpPr>
+          <p:cNvPr id="7" name="Rectangle 6">
+            <a:extLst>
+              <a:ext uri="{FF2B5EF4-FFF2-40B4-BE49-F238E27FC236}">
+                <a16:creationId xmlns:a16="http://schemas.microsoft.com/office/drawing/2014/main" id="{C2B2A8F1-8D21-214D-E9FF-F7781E10252B}"/>
+              </a:ext>
+            </a:extLst>
+          </p:cNvPr>
+          <p:cNvSpPr/>
+          <p:nvPr/>
+        </p:nvSpPr>
+        <p:spPr>
+          <a:xfrm>
+            <a:off x="786384" y="1527048"/>
+            <a:ext cx="10323576" cy="4517136"/>
+          </a:xfrm>
+          <a:prstGeom prst="rect">
+            <a:avLst/>
+          </a:prstGeom>
+          <a:noFill/>
+          <a:ln w="9525" cap="flat" cmpd="sng" algn="ctr">
+            <a:solidFill>
+              <a:schemeClr val="accent3"/>
+            </a:solidFill>
+            <a:prstDash val="solid"/>
+            <a:round/>
+            <a:headEnd type="none" w="med" len="med"/>
+            <a:tailEnd type="none" w="med" len="med"/>
+          </a:ln>
+        </p:spPr>
+        <p:style>
+          <a:lnRef idx="0">
+            <a:scrgbClr r="0" g="0" b="0"/>
+          </a:lnRef>
+          <a:fillRef idx="0">
+            <a:scrgbClr r="0" g="0" b="0"/>
+          </a:fillRef>
+          <a:effectRef idx="0">
+            <a:scrgbClr r="0" g="0" b="0"/>
+          </a:effectRef>
+          <a:fontRef idx="minor">
+            <a:schemeClr val="accent3"/>
+          </a:fontRef>
+        </p:style>
+        <p:txBody>
+          <a:bodyPr rtlCol="0" anchor="ctr"/>
+          <a:lstStyle/>
+          <a:p>
+            <a:pPr algn="ctr"/>
+            <a:endParaRPr lang="en-IN" dirty="0"/>
+          </a:p>
+        </p:txBody>
+      </p:sp>
+      <p:sp>
+        <p:nvSpPr>
+          <p:cNvPr id="5" name="TextBox 4">
+            <a:extLst>
+              <a:ext uri="{FF2B5EF4-FFF2-40B4-BE49-F238E27FC236}">
+                <a16:creationId xmlns:a16="http://schemas.microsoft.com/office/drawing/2014/main" id="{7E5E88B9-8C5A-928D-A8F5-6924CAA63974}"/>
+              </a:ext>
+            </a:extLst>
+          </p:cNvPr>
+          <p:cNvSpPr txBox="1"/>
+          <p:nvPr/>
+        </p:nvSpPr>
+        <p:spPr>
+          <a:xfrm>
+            <a:off x="1106424" y="1891187"/>
+            <a:ext cx="9683496" cy="3788858"/>
+          </a:xfrm>
+          <a:prstGeom prst="rect">
+            <a:avLst/>
+          </a:prstGeom>
+          <a:noFill/>
+        </p:spPr>
+        <p:txBody>
+          <a:bodyPr wrap="square">
+            <a:spAutoFit/>
+          </a:bodyPr>
+          <a:lstStyle>
+            <a:defPPr>
+              <a:defRPr lang="en-US"/>
+            </a:defPPr>
+            <a:lvl1pPr>
+              <a:lnSpc>
+                <a:spcPct val="150000"/>
+              </a:lnSpc>
+              <a:defRPr b="1" i="0">
+                <a:solidFill>
+                  <a:srgbClr val="0D0D0D"/>
+                </a:solidFill>
+                <a:effectLst/>
+                <a:highlight>
+                  <a:srgbClr val="FFFFFF"/>
+                </a:highlight>
+                <a:latin typeface="Segoe UI" panose="020B0502040204020203" pitchFamily="34" charset="0"/>
+                <a:cs typeface="Segoe UI" panose="020B0502040204020203" pitchFamily="34" charset="0"/>
+              </a:defRPr>
+            </a:lvl1pPr>
+          </a:lstStyle>
+          <a:p>
+            <a:r>
+              <a:rPr lang="en-US" dirty="0"/>
+              <a:t>Step 3: Set S3 Event Notifications</a:t>
+            </a:r>
+          </a:p>
+          <a:p>
+            <a:pPr marL="342900" indent="-342900">
+              <a:buFont typeface="+mj-lt"/>
+              <a:buAutoNum type="arabicPeriod"/>
+            </a:pPr>
+            <a:r>
+              <a:rPr lang="en-US" b="0" dirty="0"/>
+              <a:t>Go to your S3 bucket in the S3 console.</a:t>
+            </a:r>
+          </a:p>
+          <a:p>
+            <a:pPr marL="342900" indent="-342900">
+              <a:buFont typeface="+mj-lt"/>
+              <a:buAutoNum type="arabicPeriod"/>
+            </a:pPr>
+            <a:r>
+              <a:rPr lang="en-US" b="0" dirty="0"/>
+              <a:t>Click on Properties &gt; Event notifications.</a:t>
+            </a:r>
+          </a:p>
+          <a:p>
+            <a:pPr marL="342900" indent="-342900">
+              <a:buFont typeface="+mj-lt"/>
+              <a:buAutoNum type="arabicPeriod"/>
+            </a:pPr>
+            <a:r>
+              <a:rPr lang="en-US" b="0" dirty="0"/>
+              <a:t>Click Create event notification.</a:t>
+            </a:r>
+          </a:p>
+          <a:p>
+            <a:pPr marL="342900" indent="-342900">
+              <a:buFont typeface="+mj-lt"/>
+              <a:buAutoNum type="arabicPeriod"/>
+            </a:pPr>
+            <a:r>
+              <a:rPr lang="en-US" b="0" dirty="0"/>
+              <a:t>Name your event, and select All object create events and All object delete events under the “Events”.</a:t>
+            </a:r>
+          </a:p>
+          <a:p>
+            <a:pPr marL="342900" indent="-342900">
+              <a:buFont typeface="+mj-lt"/>
+              <a:buAutoNum type="arabicPeriod"/>
+            </a:pPr>
+            <a:r>
+              <a:rPr lang="en-US" b="0" dirty="0"/>
+              <a:t>Under “Destination”, select the Lambda function.</a:t>
+            </a:r>
+          </a:p>
+          <a:p>
+            <a:pPr marL="342900" indent="-342900">
+              <a:buFont typeface="+mj-lt"/>
+              <a:buAutoNum type="arabicPeriod"/>
+            </a:pPr>
+            <a:r>
+              <a:rPr lang="en-US" b="0" dirty="0"/>
+              <a:t>Choose the Lambda function you created in Step 2.</a:t>
+            </a:r>
+          </a:p>
+          <a:p>
+            <a:pPr marL="342900" indent="-342900">
+              <a:buFont typeface="+mj-lt"/>
+              <a:buAutoNum type="arabicPeriod"/>
+            </a:pPr>
+            <a:r>
+              <a:rPr lang="en-US" b="0" dirty="0"/>
+              <a:t>Click Save changes.</a:t>
+            </a:r>
+          </a:p>
+        </p:txBody>
+      </p:sp>
+    </p:spTree>
+    <p:extLst>
+      <p:ext uri="{BB962C8B-B14F-4D97-AF65-F5344CB8AC3E}">
+        <p14:creationId xmlns:p14="http://schemas.microsoft.com/office/powerpoint/2010/main" val="1795457676"/>
       </p:ext>
     </p:extLst>
   </p:cSld>

</xml_diff>